<commit_message>
se agregaron mapas, no hay descripcion
</commit_message>
<xml_diff>
--- a/presentación_tesis.pptx
+++ b/presentación_tesis.pptx
@@ -730,6 +730,90 @@
     <p:extLst>
       <p:ext uri="{BB962C8B-B14F-4D97-AF65-F5344CB8AC3E}">
         <p14:creationId xmlns:p14="http://schemas.microsoft.com/office/powerpoint/2010/main" val="486424917"/>
+      </p:ext>
+    </p:extLst>
+  </p:cSld>
+  <p:clrMapOvr>
+    <a:masterClrMapping/>
+  </p:clrMapOvr>
+</p:notes>
+</file>
+
+<file path=ppt/notesSlides/notesSlide4.xml><?xml version="1.0" encoding="utf-8"?>
+<p:notes xmlns:a="http://schemas.openxmlformats.org/drawingml/2006/main" xmlns:r="http://schemas.openxmlformats.org/officeDocument/2006/relationships" xmlns:p="http://schemas.openxmlformats.org/presentationml/2006/main">
+  <p:cSld>
+    <p:spTree>
+      <p:nvGrpSpPr>
+        <p:cNvPr id="1" name=""/>
+        <p:cNvGrpSpPr/>
+        <p:nvPr/>
+      </p:nvGrpSpPr>
+      <p:grpSpPr>
+        <a:xfrm>
+          <a:off x="0" y="0"/>
+          <a:ext cx="0" cy="0"/>
+          <a:chOff x="0" y="0"/>
+          <a:chExt cx="0" cy="0"/>
+        </a:xfrm>
+      </p:grpSpPr>
+      <p:sp>
+        <p:nvSpPr>
+          <p:cNvPr id="2" name="Marcador de imagen de diapositiva 1"/>
+          <p:cNvSpPr>
+            <a:spLocks noGrp="1" noRot="1" noChangeAspect="1"/>
+          </p:cNvSpPr>
+          <p:nvPr>
+            <p:ph type="sldImg"/>
+          </p:nvPr>
+        </p:nvSpPr>
+        <p:spPr/>
+      </p:sp>
+      <p:sp>
+        <p:nvSpPr>
+          <p:cNvPr id="3" name="Marcador de notas 2"/>
+          <p:cNvSpPr>
+            <a:spLocks noGrp="1"/>
+          </p:cNvSpPr>
+          <p:nvPr>
+            <p:ph type="body" idx="1"/>
+          </p:nvPr>
+        </p:nvSpPr>
+        <p:spPr/>
+        <p:txBody>
+          <a:bodyPr/>
+          <a:lstStyle/>
+          <a:p>
+            <a:endParaRPr lang="es-MX" dirty="0"/>
+          </a:p>
+        </p:txBody>
+      </p:sp>
+      <p:sp>
+        <p:nvSpPr>
+          <p:cNvPr id="4" name="Marcador de número de diapositiva 3"/>
+          <p:cNvSpPr>
+            <a:spLocks noGrp="1"/>
+          </p:cNvSpPr>
+          <p:nvPr>
+            <p:ph type="sldNum" sz="quarter" idx="10"/>
+          </p:nvPr>
+        </p:nvSpPr>
+        <p:spPr/>
+        <p:txBody>
+          <a:bodyPr/>
+          <a:lstStyle/>
+          <a:p>
+            <a:fld id="{545DF648-2ECF-4E74-B5DE-3A8267CB8548}" type="slidenum">
+              <a:rPr lang="es-MX" smtClean="0"/>
+              <a:t>11</a:t>
+            </a:fld>
+            <a:endParaRPr lang="es-MX"/>
+          </a:p>
+        </p:txBody>
+      </p:sp>
+    </p:spTree>
+    <p:extLst>
+      <p:ext uri="{BB962C8B-B14F-4D97-AF65-F5344CB8AC3E}">
+        <p14:creationId xmlns:p14="http://schemas.microsoft.com/office/powerpoint/2010/main" val="3958419640"/>
       </p:ext>
     </p:extLst>
   </p:cSld>
@@ -8840,8 +8924,8 @@
         </p:nvSpPr>
         <p:spPr>
           <a:xfrm>
-            <a:off x="677334" y="609600"/>
-            <a:ext cx="8596668" cy="665747"/>
+            <a:off x="1774614" y="637470"/>
+            <a:ext cx="2911686" cy="665747"/>
           </a:xfrm>
         </p:spPr>
         <p:txBody>
@@ -8874,7 +8958,7 @@
         </p:spPr>
         <p:txBody>
           <a:bodyPr>
-            <a:normAutofit fontScale="85000" lnSpcReduction="20000"/>
+            <a:normAutofit fontScale="77500" lnSpcReduction="20000"/>
           </a:bodyPr>
           <a:lstStyle/>
           <a:p>
@@ -8886,34 +8970,16 @@
             <a:r>
               <a:rPr lang="es-ES" dirty="0"/>
               <a:t>, “El Síndrome de Down: educación y futuro de los niños”, </a:t>
-            </a:r>
-            <a:r>
-              <a:rPr lang="es-ES" u="sng" dirty="0">
-                <a:hlinkClick r:id="rId2"/>
-              </a:rPr>
-              <a:t>http://www.guiainfantil.com/articulos/salud/sindrome-de-down/el-sindrome-de-down-educacion-y-futuro-de-los-ninos/, (consultado</a:t>
-            </a:r>
-            <a:r>
-              <a:rPr lang="es-ES" dirty="0"/>
-              <a:t>: 16/02/15)</a:t>
-            </a:r>
-            <a:endParaRPr lang="es-MX" dirty="0"/>
-          </a:p>
-          <a:p>
-            <a:pPr lvl="0"/>
-            <a:r>
-              <a:rPr lang="es-ES" dirty="0"/>
-              <a:t>Down España, “El Síndrome de Down”, </a:t>
             </a:r>
             <a:r>
               <a:rPr lang="es-ES" u="sng" dirty="0">
                 <a:hlinkClick r:id="rId3"/>
               </a:rPr>
-              <a:t>http://www.sindromedown.net/index.php?idMenu=6</a:t>
+              <a:t>http://www.guiainfantil.com/articulos/salud/sindrome-de-down/el-sindrome-de-down-educacion-y-futuro-de-los-ninos/, (consultado</a:t>
             </a:r>
             <a:r>
               <a:rPr lang="es-ES" dirty="0"/>
-              <a:t>, (consultado: 17/02/15)</a:t>
+              <a:t>: 16/02/15)</a:t>
             </a:r>
             <a:endParaRPr lang="es-MX" dirty="0"/>
           </a:p>
@@ -8921,17 +8987,17 @@
             <a:pPr lvl="0"/>
             <a:r>
               <a:rPr lang="es-ES" dirty="0"/>
-              <a:t>José A. Rodríguez (2013), “Aplicación Móvil para Síndrome de Down y Autismo” , </a:t>
+              <a:t>Down España, “El Síndrome de Down”, </a:t>
             </a:r>
             <a:r>
               <a:rPr lang="es-ES" u="sng" dirty="0">
                 <a:hlinkClick r:id="rId4"/>
               </a:rPr>
-              <a:t>http://www.consumer.es/web/es/salud/psicologia/2013/03/17/216112.php</a:t>
+              <a:t>http://www.sindromedown.net/index.php?idMenu=6</a:t>
             </a:r>
             <a:r>
               <a:rPr lang="es-ES" dirty="0"/>
-              <a:t> , (consultado: 17/02/15)</a:t>
+              <a:t>, (consultado: 17/02/15)</a:t>
             </a:r>
             <a:endParaRPr lang="es-MX" dirty="0"/>
           </a:p>
@@ -8939,17 +9005,17 @@
             <a:pPr lvl="0"/>
             <a:r>
               <a:rPr lang="es-ES" dirty="0"/>
-              <a:t>Rosete María José (2012), ”Sc@ut: un software para integrar a niños autistas y con síndrome de Down”, </a:t>
+              <a:t>José A. Rodríguez (2013), “Aplicación Móvil para Síndrome de Down y Autismo” , </a:t>
             </a:r>
             <a:r>
               <a:rPr lang="es-ES" u="sng" dirty="0">
                 <a:hlinkClick r:id="rId5"/>
               </a:rPr>
-              <a:t>https://www.fayerwayer.com/2012/04/scut-un-software-para-integrar-a-ninos-autistas-y-con-sindrome-de-down/</a:t>
+              <a:t>http://www.consumer.es/web/es/salud/psicologia/2013/03/17/216112.php</a:t>
             </a:r>
             <a:r>
               <a:rPr lang="es-ES" dirty="0"/>
-              <a:t>, (consultado: 17/02/15)</a:t>
+              <a:t> , (consultado: 17/02/15)</a:t>
             </a:r>
             <a:endParaRPr lang="es-MX" dirty="0"/>
           </a:p>
@@ -8957,69 +9023,69 @@
             <a:pPr lvl="0"/>
             <a:r>
               <a:rPr lang="es-ES" dirty="0"/>
-              <a:t>Síndrome de Down, “Características del SD”, </a:t>
+              <a:t>Rosete María José (2012), ”Sc@ut: un software para integrar a niños autistas y con síndrome de Down”, </a:t>
             </a:r>
             <a:r>
               <a:rPr lang="es-ES" u="sng" dirty="0">
                 <a:hlinkClick r:id="rId6"/>
               </a:rPr>
-              <a:t>http://www.downmx.com/caracteristicas-del-sd/</a:t>
+              <a:t>https://www.fayerwayer.com/2012/04/scut-un-software-para-integrar-a-ninos-autistas-y-con-sindrome-de-down/</a:t>
             </a:r>
             <a:r>
               <a:rPr lang="es-ES" dirty="0"/>
-              <a:t> , (consultado: 17/02/15)</a:t>
+              <a:t>, (consultado: 17/02/15)</a:t>
             </a:r>
             <a:endParaRPr lang="es-MX" dirty="0"/>
           </a:p>
           <a:p>
             <a:pPr lvl="0"/>
             <a:r>
-              <a:rPr lang="es-ES" dirty="0" smtClean="0"/>
-              <a:t>Álvaro </a:t>
-            </a:r>
-            <a:r>
               <a:rPr lang="es-ES" dirty="0"/>
-              <a:t>Fernández, José Luis González Sánchez, Luz María Roldán, María José Rodríguez </a:t>
-            </a:r>
-            <a:r>
-              <a:rPr lang="es-ES" dirty="0" err="1"/>
-              <a:t>Fórtiz</a:t>
-            </a:r>
-            <a:r>
-              <a:rPr lang="es-ES" dirty="0"/>
-              <a:t>, María Visitación Hurtado Torres, Nuria Medina </a:t>
-            </a:r>
-            <a:r>
-              <a:rPr lang="es-ES" dirty="0" err="1"/>
-              <a:t>Medina</a:t>
-            </a:r>
-            <a:r>
-              <a:rPr lang="es-ES" dirty="0"/>
-              <a:t>, “Generador Sc@ut: Sistema de Creación de Comunicadores Personalizados para la Integración”, </a:t>
+              <a:t>Síndrome de Down, “Características del SD”, </a:t>
             </a:r>
             <a:r>
               <a:rPr lang="es-ES" u="sng" dirty="0">
                 <a:hlinkClick r:id="rId7"/>
               </a:rPr>
-              <a:t>http://rita.det.uvigo.es/200908/uploads/IEEE-RITA.2009.V4.N3.A5.pdf</a:t>
+              <a:t>http://www.downmx.com/caracteristicas-del-sd/</a:t>
             </a:r>
             <a:r>
               <a:rPr lang="es-ES" dirty="0"/>
-              <a:t> , (consultado: 20/02/2015)</a:t>
+              <a:t> , (consultado: 17/02/15)</a:t>
             </a:r>
             <a:endParaRPr lang="es-MX" dirty="0"/>
           </a:p>
           <a:p>
             <a:pPr lvl="0"/>
             <a:r>
+              <a:rPr lang="es-ES" dirty="0" smtClean="0"/>
+              <a:t>Álvaro </a:t>
+            </a:r>
+            <a:r>
               <a:rPr lang="es-ES" dirty="0"/>
-              <a:t>Sc@ut, Sistema de Comunicación Aumentativa y Adaptativa(2009), </a:t>
+              <a:t>Fernández, José Luis González Sánchez, Luz María Roldán, María José Rodríguez </a:t>
+            </a:r>
+            <a:r>
+              <a:rPr lang="es-ES" dirty="0" err="1"/>
+              <a:t>Fórtiz</a:t>
+            </a:r>
+            <a:r>
+              <a:rPr lang="es-ES" dirty="0"/>
+              <a:t>, María Visitación Hurtado Torres, Nuria Medina </a:t>
+            </a:r>
+            <a:r>
+              <a:rPr lang="es-ES" dirty="0" err="1"/>
+              <a:t>Medina</a:t>
+            </a:r>
+            <a:r>
+              <a:rPr lang="es-ES" dirty="0"/>
+              <a:t>, “Generador Sc@ut: Sistema de Creación de Comunicadores Personalizados para la Integración”, </a:t>
             </a:r>
             <a:r>
               <a:rPr lang="es-ES" u="sng" dirty="0">
                 <a:hlinkClick r:id="rId8"/>
               </a:rPr>
-              <a:t>http://scaut.ugr.es/picaa/</a:t>
+              <a:t>http://rita.det.uvigo.es/200908/uploads/IEEE-RITA.2009.V4.N3.A5.pdf</a:t>
             </a:r>
             <a:r>
               <a:rPr lang="es-ES" dirty="0"/>
@@ -9031,12 +9097,30 @@
             <a:pPr lvl="0"/>
             <a:r>
               <a:rPr lang="es-ES" dirty="0"/>
-              <a:t>Fundación Orange, “Sígueme” , </a:t>
+              <a:t>Sc@ut, Sistema de Comunicación Aumentativa y Adaptativa(2009), </a:t>
             </a:r>
             <a:r>
               <a:rPr lang="es-ES" u="sng" dirty="0">
                 <a:hlinkClick r:id="rId9"/>
               </a:rPr>
+              <a:t>http://scaut.ugr.es/picaa/</a:t>
+            </a:r>
+            <a:r>
+              <a:rPr lang="es-ES" dirty="0"/>
+              <a:t> , (consultado: 20/02/2015)</a:t>
+            </a:r>
+            <a:endParaRPr lang="es-MX" dirty="0"/>
+          </a:p>
+          <a:p>
+            <a:pPr lvl="0"/>
+            <a:r>
+              <a:rPr lang="es-ES" dirty="0"/>
+              <a:t>Fundación Orange, “Sígueme” , </a:t>
+            </a:r>
+            <a:r>
+              <a:rPr lang="es-ES" u="sng" dirty="0">
+                <a:hlinkClick r:id="rId10"/>
+              </a:rPr>
               <a:t>http://www.proyectosigueme.com/</a:t>
             </a:r>
             <a:r>
@@ -9049,38 +9133,94 @@
             </a:r>
           </a:p>
           <a:p>
+            <a:pPr lvl="0"/>
+            <a:r>
+              <a:rPr lang="es-ES" dirty="0"/>
+              <a:t>Picaa: Aprendizaje </a:t>
+            </a:r>
+            <a:r>
+              <a:rPr lang="es-ES" dirty="0" smtClean="0"/>
+              <a:t>Móvil</a:t>
+            </a:r>
+            <a:r>
+              <a:rPr lang="es-MX" b="1" dirty="0" smtClean="0"/>
+              <a:t>, </a:t>
+            </a:r>
+            <a:r>
+              <a:rPr lang="es-MX" dirty="0" smtClean="0">
+                <a:solidFill>
+                  <a:schemeClr val="tx1"/>
+                </a:solidFill>
+              </a:rPr>
+              <a:t>Ing</a:t>
+            </a:r>
             <a:r>
               <a:rPr lang="es-MX" dirty="0">
                 <a:solidFill>
                   <a:schemeClr val="tx1"/>
                 </a:solidFill>
               </a:rPr>
-              <a:t>Ing. </a:t>
-            </a:r>
-            <a:r>
-              <a:rPr lang="es-MX">
+              <a:t>. Álvaro Fernández, Universidad de Granada(2012</a:t>
+            </a:r>
+            <a:r>
+              <a:rPr lang="es-MX" dirty="0" smtClean="0">
                 <a:solidFill>
                   <a:schemeClr val="tx1"/>
                 </a:solidFill>
               </a:rPr>
-              <a:t>Álvaro Fernández, Universidad </a:t>
-            </a:r>
-            <a:r>
-              <a:rPr lang="es-MX">
+              <a:t>), </a:t>
+            </a:r>
+            <a:r>
+              <a:rPr lang="es-MX" dirty="0" smtClean="0">
+                <a:solidFill>
+                  <a:schemeClr val="tx1"/>
+                </a:solidFill>
+                <a:hlinkClick r:id="rId11"/>
+              </a:rPr>
+              <a:t>http</a:t>
+            </a:r>
+            <a:r>
+              <a:rPr lang="es-MX" dirty="0">
+                <a:solidFill>
+                  <a:schemeClr val="tx1"/>
+                </a:solidFill>
+                <a:hlinkClick r:id="rId11"/>
+              </a:rPr>
+              <a:t>://asistic.ugr.es/picaa</a:t>
+            </a:r>
+            <a:r>
+              <a:rPr lang="es-MX" dirty="0" smtClean="0">
+                <a:solidFill>
+                  <a:schemeClr val="tx1"/>
+                </a:solidFill>
+                <a:hlinkClick r:id="rId11"/>
+              </a:rPr>
+              <a:t>/</a:t>
+            </a:r>
+            <a:r>
+              <a:rPr lang="es-MX" dirty="0" smtClean="0">
                 <a:solidFill>
                   <a:schemeClr val="tx1"/>
                 </a:solidFill>
               </a:rPr>
-              <a:t>de </a:t>
-            </a:r>
-            <a:r>
-              <a:rPr lang="es-MX" smtClean="0">
-                <a:solidFill>
-                  <a:schemeClr val="tx1"/>
-                </a:solidFill>
-              </a:rPr>
-              <a:t>Granada,</a:t>
-            </a:r>
+              <a:t> , </a:t>
+            </a:r>
+            <a:r>
+              <a:rPr lang="es-ES" dirty="0"/>
+              <a:t>(consultado: </a:t>
+            </a:r>
+            <a:r>
+              <a:rPr lang="es-ES" dirty="0" smtClean="0"/>
+              <a:t>25/02/2015)</a:t>
+            </a:r>
+          </a:p>
+          <a:p>
+            <a:pPr marL="0" lvl="0" indent="0">
+              <a:buNone/>
+            </a:pPr>
+            <a:endParaRPr lang="es-ES" dirty="0"/>
+          </a:p>
+          <a:p>
             <a:endParaRPr lang="es-MX" dirty="0">
               <a:solidFill>
                 <a:schemeClr val="tx1"/>
@@ -9099,16 +9239,21 @@
             <p:ph type="ftr" sz="quarter" idx="11"/>
           </p:nvPr>
         </p:nvSpPr>
-        <p:spPr/>
+        <p:spPr>
+          <a:xfrm>
+            <a:off x="10012680" y="6492875"/>
+            <a:ext cx="1328101" cy="365125"/>
+          </a:xfrm>
+        </p:spPr>
         <p:txBody>
           <a:bodyPr/>
           <a:lstStyle/>
           <a:p>
             <a:r>
-              <a:rPr lang="es-MX" smtClean="0"/>
+              <a:rPr lang="es-MX" dirty="0" err="1" smtClean="0"/>
               <a:t>EduDown</a:t>
             </a:r>
-            <a:endParaRPr lang="es-MX"/>
+            <a:endParaRPr lang="es-MX" dirty="0"/>
           </a:p>
         </p:txBody>
       </p:sp>

</xml_diff>